<commit_message>
remove confidentiality footer on some slides
</commit_message>
<xml_diff>
--- a/doc/14.go_measure_and_pid.pptx
+++ b/doc/14.go_measure_and_pid.pptx
@@ -206,7 +206,7 @@
             <a:fld id="{08B3F974-BB90-4059-9901-8147A3A63439}" type="datetimeFigureOut">
               <a:rPr lang="en-US" smtClean="0"/>
               <a:pPr/>
-              <a:t>2/10/2016</a:t>
+              <a:t>5/23/2016</a:t>
             </a:fld>
             <a:endParaRPr lang="en-US" dirty="0"/>
           </a:p>
@@ -42785,12 +42785,7 @@
             <p:ph idx="1"/>
           </p:nvPr>
         </p:nvSpPr>
-        <p:spPr>
-          <a:xfrm>
-            <a:off x="264160" y="967575"/>
-            <a:ext cx="8584006" cy="3367589"/>
-          </a:xfrm>
-        </p:spPr>
+        <p:spPr/>
         <p:txBody>
           <a:bodyPr/>
           <a:lstStyle/>
@@ -43025,12 +43020,7 @@
             <p:ph idx="1"/>
           </p:nvPr>
         </p:nvSpPr>
-        <p:spPr>
-          <a:xfrm>
-            <a:off x="264160" y="967575"/>
-            <a:ext cx="8584006" cy="3242939"/>
-          </a:xfrm>
-        </p:spPr>
+        <p:spPr/>
         <p:txBody>
           <a:bodyPr/>
           <a:lstStyle/>
@@ -43232,12 +43222,7 @@
             <p:ph idx="1"/>
           </p:nvPr>
         </p:nvSpPr>
-        <p:spPr>
-          <a:xfrm>
-            <a:off x="264160" y="967575"/>
-            <a:ext cx="8584006" cy="3778470"/>
-          </a:xfrm>
-        </p:spPr>
+        <p:spPr/>
         <p:txBody>
           <a:bodyPr/>
           <a:lstStyle/>
@@ -43485,12 +43470,7 @@
             <p:ph type="title"/>
           </p:nvPr>
         </p:nvSpPr>
-        <p:spPr>
-          <a:xfrm>
-            <a:off x="264159" y="53113"/>
-            <a:ext cx="7334209" cy="732441"/>
-          </a:xfrm>
-        </p:spPr>
+        <p:spPr/>
         <p:txBody>
           <a:bodyPr>
             <a:normAutofit/>
@@ -43583,8 +43563,8 @@
         </p:nvSpPr>
         <p:spPr>
           <a:xfrm>
-            <a:off x="3568588" y="967575"/>
-            <a:ext cx="5279577" cy="3191130"/>
+            <a:off x="3665496" y="967575"/>
+            <a:ext cx="5332608" cy="3959532"/>
           </a:xfrm>
         </p:spPr>
         <p:txBody>
@@ -43682,11 +43662,7 @@
             </a:r>
             <a:r>
               <a:rPr lang="en-US" sz="1400" dirty="0" smtClean="0"/>
-              <a:t>.g</a:t>
-            </a:r>
-            <a:r>
-              <a:rPr lang="en-US" sz="1400" dirty="0" smtClean="0"/>
-              <a:t>. </a:t>
+              <a:t>.g. </a:t>
             </a:r>
             <a:r>
               <a:rPr lang="en-US" sz="1400" dirty="0" err="1" smtClean="0">
@@ -43738,11 +43714,7 @@
           <a:p>
             <a:r>
               <a:rPr lang="en-US" sz="1800" dirty="0" smtClean="0"/>
-              <a:t>User specifies </a:t>
-            </a:r>
-            <a:r>
-              <a:rPr lang="en-US" sz="1800" dirty="0" smtClean="0"/>
-              <a:t>“</a:t>
+              <a:t>User specifies “</a:t>
             </a:r>
             <a:r>
               <a:rPr lang="en-US" sz="1800" dirty="0" smtClean="0">
@@ -43764,15 +43736,7 @@
             </a:r>
             <a:r>
               <a:rPr lang="en-US" sz="1800" dirty="0" smtClean="0"/>
-              <a:t>”, </a:t>
-            </a:r>
-            <a:r>
-              <a:rPr lang="en-US" sz="1800" dirty="0" smtClean="0"/>
-              <a:t>and </a:t>
-            </a:r>
-            <a:r>
-              <a:rPr lang="en-US" sz="1800" dirty="0" smtClean="0"/>
-              <a:t>“</a:t>
+              <a:t>”, and “</a:t>
             </a:r>
             <a:r>
               <a:rPr lang="en-US" sz="1800" dirty="0" smtClean="0">
@@ -43783,11 +43747,7 @@
             </a:r>
             <a:r>
               <a:rPr lang="en-US" sz="1800" dirty="0" smtClean="0"/>
-              <a:t>” </a:t>
-            </a:r>
-            <a:r>
-              <a:rPr lang="en-US" sz="1800" dirty="0" smtClean="0"/>
-              <a:t>constants.</a:t>
+              <a:t>” constants.</a:t>
             </a:r>
           </a:p>
         </p:txBody>
@@ -43938,12 +43898,7 @@
             <p:ph idx="1"/>
           </p:nvPr>
         </p:nvSpPr>
-        <p:spPr>
-          <a:xfrm>
-            <a:off x="264160" y="967575"/>
-            <a:ext cx="8584006" cy="1938992"/>
-          </a:xfrm>
-        </p:spPr>
+        <p:spPr/>
         <p:txBody>
           <a:bodyPr/>
           <a:lstStyle/>
@@ -44079,12 +44034,7 @@
             <p:ph idx="1"/>
           </p:nvPr>
         </p:nvSpPr>
-        <p:spPr>
-          <a:xfrm>
-            <a:off x="264160" y="967575"/>
-            <a:ext cx="8584006" cy="3260380"/>
-          </a:xfrm>
-        </p:spPr>
+        <p:spPr/>
         <p:txBody>
           <a:bodyPr/>
           <a:lstStyle/>
@@ -44124,11 +44074,7 @@
             </a:pPr>
             <a:r>
               <a:rPr lang="en-US" sz="1600" dirty="0" smtClean="0"/>
-              <a:t>   </a:t>
-            </a:r>
-            <a:r>
-              <a:rPr lang="en-US" sz="1600" dirty="0" smtClean="0"/>
-              <a:t>"</a:t>
+              <a:t>   "</a:t>
             </a:r>
             <a:r>
               <a:rPr lang="en-US" sz="1600" dirty="0" smtClean="0">
@@ -44139,11 +44085,7 @@
             </a:r>
             <a:r>
               <a:rPr lang="en-US" sz="1600" dirty="0" smtClean="0"/>
-              <a:t>" </a:t>
-            </a:r>
-            <a:r>
-              <a:rPr lang="en-US" sz="1600" dirty="0" smtClean="0"/>
-              <a:t>times the error signal	(</a:t>
+              <a:t>" times the error signal	(</a:t>
             </a:r>
             <a:r>
               <a:rPr lang="en-US" sz="1600" b="1" u="sng" dirty="0" smtClean="0"/>
@@ -44165,11 +44107,7 @@
             </a:br>
             <a:r>
               <a:rPr lang="en-US" sz="1600" dirty="0" smtClean="0"/>
-              <a:t>+ </a:t>
-            </a:r>
-            <a:r>
-              <a:rPr lang="en-US" sz="1600" dirty="0" smtClean="0"/>
-              <a:t>"</a:t>
+              <a:t>+ "</a:t>
             </a:r>
             <a:r>
               <a:rPr lang="en-US" sz="1600" dirty="0" smtClean="0">
@@ -44180,11 +44118,7 @@
             </a:r>
             <a:r>
               <a:rPr lang="en-US" sz="1600" dirty="0" smtClean="0"/>
-              <a:t>" </a:t>
-            </a:r>
-            <a:r>
-              <a:rPr lang="en-US" sz="1600" dirty="0" smtClean="0"/>
-              <a:t>times the sum of the error signal since the start of the test	(</a:t>
+              <a:t>" times the sum of the error signal since the start of the test	(</a:t>
             </a:r>
             <a:r>
               <a:rPr lang="en-US" sz="1600" b="1" u="sng" dirty="0" smtClean="0"/>
@@ -44206,11 +44140,7 @@
             </a:br>
             <a:r>
               <a:rPr lang="en-US" sz="1600" dirty="0" smtClean="0"/>
-              <a:t>+ </a:t>
-            </a:r>
-            <a:r>
-              <a:rPr lang="en-US" sz="1600" dirty="0" smtClean="0"/>
-              <a:t>"</a:t>
+              <a:t>+ "</a:t>
             </a:r>
             <a:r>
               <a:rPr lang="en-US" sz="1600" dirty="0" smtClean="0">
@@ -44221,11 +44151,7 @@
             </a:r>
             <a:r>
               <a:rPr lang="en-US" sz="1600" dirty="0" smtClean="0"/>
-              <a:t>" </a:t>
-            </a:r>
-            <a:r>
-              <a:rPr lang="en-US" sz="1600" dirty="0" smtClean="0"/>
-              <a:t>time the rate of change of the error signal	</a:t>
+              <a:t>" time the rate of change of the error signal	</a:t>
             </a:r>
             <a:r>
               <a:rPr lang="en-US" sz="1400" dirty="0" smtClean="0"/>
@@ -44344,83 +44270,6 @@
       </p:grpSpPr>
       <p:sp>
         <p:nvSpPr>
-          <p:cNvPr id="3" name="Title 2"/>
-          <p:cNvSpPr>
-            <a:spLocks noGrp="1"/>
-          </p:cNvSpPr>
-          <p:nvPr>
-            <p:ph type="title"/>
-          </p:nvPr>
-        </p:nvSpPr>
-        <p:spPr/>
-        <p:txBody>
-          <a:bodyPr/>
-          <a:lstStyle/>
-          <a:p>
-            <a:r>
-              <a:rPr lang="en-US" dirty="0" smtClean="0"/>
-              <a:t>Tuning PID loop</a:t>
-            </a:r>
-            <a:endParaRPr lang="en-US" dirty="0"/>
-          </a:p>
-        </p:txBody>
-      </p:sp>
-      <p:pic>
-        <p:nvPicPr>
-          <p:cNvPr id="1025" name="Picture 1"/>
-          <p:cNvPicPr>
-            <a:picLocks noChangeAspect="1" noChangeArrowheads="1"/>
-          </p:cNvPicPr>
-          <p:nvPr/>
-        </p:nvPicPr>
-        <p:blipFill>
-          <a:blip r:embed="rId2">
-            <a:extLst>
-              <a:ext uri="{28A0092B-C50C-407E-A947-70E740481C1C}">
-                <a14:useLocalDpi xmlns:a14="http://schemas.microsoft.com/office/drawing/2010/main" val="0"/>
-              </a:ext>
-            </a:extLst>
-          </a:blip>
-          <a:srcRect/>
-          <a:stretch>
-            <a:fillRect/>
-          </a:stretch>
-        </p:blipFill>
-        <p:spPr bwMode="auto">
-          <a:xfrm>
-            <a:off x="264160" y="1003885"/>
-            <a:ext cx="3444240" cy="1706076"/>
-          </a:xfrm>
-          <a:prstGeom prst="rect">
-            <a:avLst/>
-          </a:prstGeom>
-          <a:noFill/>
-          <a:ln>
-            <a:noFill/>
-          </a:ln>
-          <a:extLst>
-            <a:ext uri="{909E8E84-426E-40DD-AFC4-6F175D3DCCD1}">
-              <a14:hiddenFill xmlns:a14="http://schemas.microsoft.com/office/drawing/2010/main">
-                <a:solidFill>
-                  <a:schemeClr val="accent1"/>
-                </a:solidFill>
-              </a14:hiddenFill>
-            </a:ext>
-            <a:ext uri="{91240B29-F687-4F45-9708-019B960494DF}">
-              <a14:hiddenLine xmlns:a14="http://schemas.microsoft.com/office/drawing/2010/main" w="9525">
-                <a:solidFill>
-                  <a:schemeClr val="tx1"/>
-                </a:solidFill>
-                <a:miter lim="800000"/>
-                <a:headEnd/>
-                <a:tailEnd/>
-              </a14:hiddenLine>
-            </a:ext>
-          </a:extLst>
-        </p:spPr>
-      </p:pic>
-      <p:sp>
-        <p:nvSpPr>
           <p:cNvPr id="5" name="Content Placeholder 4"/>
           <p:cNvSpPr>
             <a:spLocks noGrp="1"/>
@@ -44429,12 +44278,7 @@
             <p:ph idx="1"/>
           </p:nvPr>
         </p:nvSpPr>
-        <p:spPr>
-          <a:xfrm>
-            <a:off x="3898900" y="967574"/>
-            <a:ext cx="4949266" cy="4047262"/>
-          </a:xfrm>
-        </p:spPr>
+        <p:spPr/>
         <p:txBody>
           <a:bodyPr/>
           <a:lstStyle/>
@@ -44542,6 +44386,83 @@
           </a:p>
         </p:txBody>
       </p:sp>
+      <p:sp>
+        <p:nvSpPr>
+          <p:cNvPr id="3" name="Title 2"/>
+          <p:cNvSpPr>
+            <a:spLocks noGrp="1"/>
+          </p:cNvSpPr>
+          <p:nvPr>
+            <p:ph type="title"/>
+          </p:nvPr>
+        </p:nvSpPr>
+        <p:spPr/>
+        <p:txBody>
+          <a:bodyPr/>
+          <a:lstStyle/>
+          <a:p>
+            <a:r>
+              <a:rPr lang="en-US" dirty="0" smtClean="0"/>
+              <a:t>Tuning PID loop</a:t>
+            </a:r>
+            <a:endParaRPr lang="en-US" dirty="0"/>
+          </a:p>
+        </p:txBody>
+      </p:sp>
+      <p:pic>
+        <p:nvPicPr>
+          <p:cNvPr id="1025" name="Picture 1"/>
+          <p:cNvPicPr>
+            <a:picLocks noChangeAspect="1" noChangeArrowheads="1"/>
+          </p:cNvPicPr>
+          <p:nvPr/>
+        </p:nvPicPr>
+        <p:blipFill>
+          <a:blip r:embed="rId2">
+            <a:extLst>
+              <a:ext uri="{28A0092B-C50C-407E-A947-70E740481C1C}">
+                <a14:useLocalDpi xmlns:a14="http://schemas.microsoft.com/office/drawing/2010/main" val="0"/>
+              </a:ext>
+            </a:extLst>
+          </a:blip>
+          <a:srcRect/>
+          <a:stretch>
+            <a:fillRect/>
+          </a:stretch>
+        </p:blipFill>
+        <p:spPr bwMode="auto">
+          <a:xfrm>
+            <a:off x="264160" y="1003885"/>
+            <a:ext cx="3444240" cy="1706076"/>
+          </a:xfrm>
+          <a:prstGeom prst="rect">
+            <a:avLst/>
+          </a:prstGeom>
+          <a:noFill/>
+          <a:ln>
+            <a:noFill/>
+          </a:ln>
+          <a:extLst>
+            <a:ext uri="{909E8E84-426E-40DD-AFC4-6F175D3DCCD1}">
+              <a14:hiddenFill xmlns:a14="http://schemas.microsoft.com/office/drawing/2010/main">
+                <a:solidFill>
+                  <a:schemeClr val="accent1"/>
+                </a:solidFill>
+              </a14:hiddenFill>
+            </a:ext>
+            <a:ext uri="{91240B29-F687-4F45-9708-019B960494DF}">
+              <a14:hiddenLine xmlns:a14="http://schemas.microsoft.com/office/drawing/2010/main" w="9525">
+                <a:solidFill>
+                  <a:schemeClr val="tx1"/>
+                </a:solidFill>
+                <a:miter lim="800000"/>
+                <a:headEnd/>
+                <a:tailEnd/>
+              </a14:hiddenLine>
+            </a:ext>
+          </a:extLst>
+        </p:spPr>
+      </p:pic>
       <p:pic>
         <p:nvPicPr>
           <p:cNvPr id="1026" name="Picture 2"/>
@@ -44650,12 +44571,6 @@
               </a:rPr>
               <a:t>PID gain too high, overcorrection oscillation</a:t>
             </a:r>
-            <a:endParaRPr lang="en-US" sz="1000" dirty="0" smtClean="0">
-              <a:solidFill>
-                <a:schemeClr val="tx1"/>
-              </a:solidFill>
-              <a:latin typeface="+mj-lt"/>
-            </a:endParaRPr>
           </a:p>
         </p:txBody>
       </p:sp>
@@ -44713,12 +44628,6 @@
               </a:rPr>
               <a:t>PID gain too low, times out before getting there</a:t>
             </a:r>
-            <a:endParaRPr lang="en-US" sz="1000" dirty="0" smtClean="0">
-              <a:solidFill>
-                <a:schemeClr val="tx1"/>
-              </a:solidFill>
-              <a:latin typeface="+mj-lt"/>
-            </a:endParaRPr>
           </a:p>
         </p:txBody>
       </p:sp>
@@ -44776,12 +44685,6 @@
               </a:rPr>
               <a:t>Good</a:t>
             </a:r>
-            <a:endParaRPr lang="en-US" sz="1000" dirty="0" smtClean="0">
-              <a:solidFill>
-                <a:schemeClr val="tx1"/>
-              </a:solidFill>
-              <a:latin typeface="+mj-lt"/>
-            </a:endParaRPr>
           </a:p>
         </p:txBody>
       </p:sp>
@@ -44839,12 +44742,6 @@
               </a:rPr>
               <a:t>Good</a:t>
             </a:r>
-            <a:endParaRPr lang="en-US" sz="1000" dirty="0" smtClean="0">
-              <a:solidFill>
-                <a:schemeClr val="tx1"/>
-              </a:solidFill>
-              <a:latin typeface="+mj-lt"/>
-            </a:endParaRPr>
           </a:p>
         </p:txBody>
       </p:sp>
@@ -44902,12 +44799,6 @@
               </a:rPr>
               <a:t>Trifle high, but OK</a:t>
             </a:r>
-            <a:endParaRPr lang="en-US" sz="1000" dirty="0" smtClean="0">
-              <a:solidFill>
-                <a:schemeClr val="tx1"/>
-              </a:solidFill>
-              <a:latin typeface="+mj-lt"/>
-            </a:endParaRPr>
           </a:p>
         </p:txBody>
       </p:sp>
@@ -44970,12 +44861,7 @@
             <p:ph idx="1"/>
           </p:nvPr>
         </p:nvSpPr>
-        <p:spPr>
-          <a:xfrm>
-            <a:off x="264160" y="967575"/>
-            <a:ext cx="8584006" cy="3519040"/>
-          </a:xfrm>
-        </p:spPr>
+        <p:spPr/>
         <p:txBody>
           <a:bodyPr numCol="2"/>
           <a:lstStyle/>
@@ -45049,14 +44935,7 @@
                 <a:latin typeface="Courier New" pitchFamily="49" charset="0"/>
                 <a:cs typeface="Courier New" pitchFamily="49" charset="0"/>
               </a:rPr>
-              <a:t> </a:t>
-            </a:r>
-            <a:r>
-              <a:rPr lang="en-US" sz="1200" dirty="0" smtClean="0">
-                <a:latin typeface="Courier New" pitchFamily="49" charset="0"/>
-                <a:cs typeface="Courier New" pitchFamily="49" charset="0"/>
-              </a:rPr>
-              <a:t>= 5</a:t>
+              <a:t> = 5</a:t>
             </a:r>
           </a:p>
           <a:p>
@@ -45520,14 +45399,7 @@
                 <a:latin typeface="Courier New" pitchFamily="49" charset="0"/>
                 <a:cs typeface="Courier New" pitchFamily="49" charset="0"/>
               </a:rPr>
-              <a:t>source = </a:t>
-            </a:r>
-            <a:r>
-              <a:rPr lang="en-US" sz="1200" dirty="0" smtClean="0">
-                <a:latin typeface="Courier New" pitchFamily="49" charset="0"/>
-                <a:cs typeface="Courier New" pitchFamily="49" charset="0"/>
-              </a:rPr>
-              <a:t>""</a:t>
+              <a:t>source = ""</a:t>
             </a:r>
           </a:p>
           <a:p>
@@ -45589,14 +45461,7 @@
                 <a:latin typeface="Courier New" pitchFamily="49" charset="0"/>
                 <a:cs typeface="Courier New" pitchFamily="49" charset="0"/>
               </a:rPr>
-              <a:t> </a:t>
-            </a:r>
-            <a:r>
-              <a:rPr lang="en-US" sz="1200" dirty="0" smtClean="0">
-                <a:latin typeface="Courier New" pitchFamily="49" charset="0"/>
-                <a:cs typeface="Courier New" pitchFamily="49" charset="0"/>
-              </a:rPr>
-              <a:t>= ""</a:t>
+              <a:t> = ""</a:t>
             </a:r>
           </a:p>
           <a:p>

</xml_diff>